<commit_message>
Rough draft of ppt done
</commit_message>
<xml_diff>
--- a/Final_presentation.pptx
+++ b/Final_presentation.pptx
@@ -12,6 +12,10 @@
     <p:sldId id="260" r:id="rId6"/>
     <p:sldId id="261" r:id="rId7"/>
     <p:sldId id="262" r:id="rId8"/>
+    <p:sldId id="263" r:id="rId9"/>
+    <p:sldId id="264" r:id="rId10"/>
+    <p:sldId id="265" r:id="rId11"/>
+    <p:sldId id="266" r:id="rId12"/>
   </p:sldIdLst>
   <p:sldSz cx="12192000" cy="6858000"/>
   <p:notesSz cx="6858000" cy="9144000"/>
@@ -110,6 +114,11 @@
       </a:defRPr>
     </a:lvl9pPr>
   </p:defaultTextStyle>
+  <p:extLst>
+    <p:ext uri="{EFAFB233-063F-42B5-8137-9DF3F51BA10A}">
+      <p15:sldGuideLst xmlns:p15="http://schemas.microsoft.com/office/powerpoint/2012/main"/>
+    </p:ext>
+  </p:extLst>
 </p:presentation>
 </file>
 
@@ -3400,6 +3409,208 @@
 </p:sld>
 </file>
 
+<file path=ppt/slides/slide10.xml><?xml version="1.0" encoding="utf-8"?>
+<p:sld xmlns:a="http://schemas.openxmlformats.org/drawingml/2006/main" xmlns:r="http://schemas.openxmlformats.org/officeDocument/2006/relationships" xmlns:p="http://schemas.openxmlformats.org/presentationml/2006/main">
+  <p:cSld>
+    <p:spTree>
+      <p:nvGrpSpPr>
+        <p:cNvPr id="1" name=""/>
+        <p:cNvGrpSpPr/>
+        <p:nvPr/>
+      </p:nvGrpSpPr>
+      <p:grpSpPr>
+        <a:xfrm>
+          <a:off x="0" y="0"/>
+          <a:ext cx="0" cy="0"/>
+          <a:chOff x="0" y="0"/>
+          <a:chExt cx="0" cy="0"/>
+        </a:xfrm>
+      </p:grpSpPr>
+      <p:sp>
+        <p:nvSpPr>
+          <p:cNvPr id="2" name="Title 1">
+            <a:extLst>
+              <a:ext uri="{FF2B5EF4-FFF2-40B4-BE49-F238E27FC236}">
+                <a16:creationId xmlns:a16="http://schemas.microsoft.com/office/drawing/2014/main" id="{5CFDB9A6-A9B1-6D4F-94E2-D1C61DCB983F}"/>
+              </a:ext>
+            </a:extLst>
+          </p:cNvPr>
+          <p:cNvSpPr>
+            <a:spLocks noGrp="1"/>
+          </p:cNvSpPr>
+          <p:nvPr>
+            <p:ph type="title"/>
+          </p:nvPr>
+        </p:nvSpPr>
+        <p:spPr/>
+        <p:txBody>
+          <a:bodyPr/>
+          <a:lstStyle/>
+          <a:p>
+            <a:r>
+              <a:rPr lang="en-US" dirty="0"/>
+              <a:t>Lessons Learned</a:t>
+            </a:r>
+          </a:p>
+        </p:txBody>
+      </p:sp>
+      <p:sp>
+        <p:nvSpPr>
+          <p:cNvPr id="3" name="Content Placeholder 2">
+            <a:extLst>
+              <a:ext uri="{FF2B5EF4-FFF2-40B4-BE49-F238E27FC236}">
+                <a16:creationId xmlns:a16="http://schemas.microsoft.com/office/drawing/2014/main" id="{BB5381C6-C449-C64C-BC8C-DAC372E613C9}"/>
+              </a:ext>
+            </a:extLst>
+          </p:cNvPr>
+          <p:cNvSpPr>
+            <a:spLocks noGrp="1"/>
+          </p:cNvSpPr>
+          <p:nvPr>
+            <p:ph idx="1"/>
+          </p:nvPr>
+        </p:nvSpPr>
+        <p:spPr/>
+        <p:txBody>
+          <a:bodyPr/>
+          <a:lstStyle/>
+          <a:p>
+            <a:r>
+              <a:rPr lang="en-US" dirty="0"/>
+              <a:t>Uploading ~800,000 </a:t>
+            </a:r>
+            <a:r>
+              <a:rPr lang="en-US" dirty="0" err="1"/>
+              <a:t>Covid</a:t>
+            </a:r>
+            <a:r>
+              <a:rPr lang="en-US" dirty="0"/>
+              <a:t> Records from counties, states, and US into Neo4j can be a computationally demanding process if not optimized correctly</a:t>
+            </a:r>
+          </a:p>
+          <a:p>
+            <a:pPr lvl="1"/>
+            <a:r>
+              <a:rPr lang="en-US" dirty="0"/>
+              <a:t>Learned to work around directly importing that much data into Neo4j directly and all at once, instead created constraints to help unwind created Python data structures to more quickly import and establish the data into Neo4j</a:t>
+            </a:r>
+          </a:p>
+          <a:p>
+            <a:endParaRPr lang="en-US" dirty="0"/>
+          </a:p>
+        </p:txBody>
+      </p:sp>
+    </p:spTree>
+    <p:extLst>
+      <p:ext uri="{BB962C8B-B14F-4D97-AF65-F5344CB8AC3E}">
+        <p14:creationId xmlns:p14="http://schemas.microsoft.com/office/powerpoint/2010/main" val="3166189442"/>
+      </p:ext>
+    </p:extLst>
+  </p:cSld>
+  <p:clrMapOvr>
+    <a:masterClrMapping/>
+  </p:clrMapOvr>
+</p:sld>
+</file>
+
+<file path=ppt/slides/slide11.xml><?xml version="1.0" encoding="utf-8"?>
+<p:sld xmlns:a="http://schemas.openxmlformats.org/drawingml/2006/main" xmlns:r="http://schemas.openxmlformats.org/officeDocument/2006/relationships" xmlns:p="http://schemas.openxmlformats.org/presentationml/2006/main">
+  <p:cSld>
+    <p:spTree>
+      <p:nvGrpSpPr>
+        <p:cNvPr id="1" name=""/>
+        <p:cNvGrpSpPr/>
+        <p:nvPr/>
+      </p:nvGrpSpPr>
+      <p:grpSpPr>
+        <a:xfrm>
+          <a:off x="0" y="0"/>
+          <a:ext cx="0" cy="0"/>
+          <a:chOff x="0" y="0"/>
+          <a:chExt cx="0" cy="0"/>
+        </a:xfrm>
+      </p:grpSpPr>
+      <p:sp>
+        <p:nvSpPr>
+          <p:cNvPr id="2" name="Title 1">
+            <a:extLst>
+              <a:ext uri="{FF2B5EF4-FFF2-40B4-BE49-F238E27FC236}">
+                <a16:creationId xmlns:a16="http://schemas.microsoft.com/office/drawing/2014/main" id="{AE8C31BE-5978-A247-B71B-0448DD3B619C}"/>
+              </a:ext>
+            </a:extLst>
+          </p:cNvPr>
+          <p:cNvSpPr>
+            <a:spLocks noGrp="1"/>
+          </p:cNvSpPr>
+          <p:nvPr>
+            <p:ph type="title"/>
+          </p:nvPr>
+        </p:nvSpPr>
+        <p:spPr/>
+        <p:txBody>
+          <a:bodyPr/>
+          <a:lstStyle/>
+          <a:p>
+            <a:r>
+              <a:rPr lang="en-US" dirty="0"/>
+              <a:t>Open Issues/Future Work</a:t>
+            </a:r>
+          </a:p>
+        </p:txBody>
+      </p:sp>
+      <p:sp>
+        <p:nvSpPr>
+          <p:cNvPr id="3" name="Content Placeholder 2">
+            <a:extLst>
+              <a:ext uri="{FF2B5EF4-FFF2-40B4-BE49-F238E27FC236}">
+                <a16:creationId xmlns:a16="http://schemas.microsoft.com/office/drawing/2014/main" id="{DA09F66C-C963-6645-A699-6C15BFBC2A29}"/>
+              </a:ext>
+            </a:extLst>
+          </p:cNvPr>
+          <p:cNvSpPr>
+            <a:spLocks noGrp="1"/>
+          </p:cNvSpPr>
+          <p:nvPr>
+            <p:ph idx="1"/>
+          </p:nvPr>
+        </p:nvSpPr>
+        <p:spPr/>
+        <p:txBody>
+          <a:bodyPr/>
+          <a:lstStyle/>
+          <a:p>
+            <a:r>
+              <a:rPr lang="en-US" dirty="0"/>
+              <a:t>Implement Clustering Algorithms to help predict where future cases or spikes may occur</a:t>
+            </a:r>
+          </a:p>
+          <a:p>
+            <a:r>
+              <a:rPr lang="en-US" dirty="0"/>
+              <a:t>Implement a recommendation system based on county attributes to compare different geographical regions of similar number of infections and population</a:t>
+            </a:r>
+          </a:p>
+          <a:p>
+            <a:r>
+              <a:rPr lang="en-US" dirty="0"/>
+              <a:t>Highlight trendlines out of the ordinary for specific geographical regions</a:t>
+            </a:r>
+          </a:p>
+        </p:txBody>
+      </p:sp>
+    </p:spTree>
+    <p:extLst>
+      <p:ext uri="{BB962C8B-B14F-4D97-AF65-F5344CB8AC3E}">
+        <p14:creationId xmlns:p14="http://schemas.microsoft.com/office/powerpoint/2010/main" val="3287585363"/>
+      </p:ext>
+    </p:extLst>
+  </p:cSld>
+  <p:clrMapOvr>
+    <a:masterClrMapping/>
+  </p:clrMapOvr>
+</p:sld>
+</file>
+
 <file path=ppt/slides/slide2.xml><?xml version="1.0" encoding="utf-8"?>
 <p:sld xmlns:a="http://schemas.openxmlformats.org/drawingml/2006/main" xmlns:r="http://schemas.openxmlformats.org/officeDocument/2006/relationships" xmlns:p="http://schemas.openxmlformats.org/presentationml/2006/main">
   <p:cSld>
@@ -4272,7 +4483,10 @@
           <a:bodyPr/>
           <a:lstStyle/>
           <a:p>
-            <a:endParaRPr lang="en-US"/>
+            <a:r>
+              <a:rPr lang="en-US" dirty="0"/>
+              <a:t>Tools used</a:t>
+            </a:r>
           </a:p>
         </p:txBody>
       </p:sp>
@@ -4297,7 +4511,44 @@
           <a:bodyPr/>
           <a:lstStyle/>
           <a:p>
-            <a:endParaRPr lang="en-US"/>
+            <a:r>
+              <a:rPr lang="en-US" dirty="0"/>
+              <a:t>Py2Neo</a:t>
+            </a:r>
+          </a:p>
+          <a:p>
+            <a:pPr lvl="1"/>
+            <a:r>
+              <a:rPr lang="en-US" dirty="0"/>
+              <a:t>Object-Graph Mapping</a:t>
+            </a:r>
+          </a:p>
+          <a:p>
+            <a:pPr lvl="2"/>
+            <a:r>
+              <a:rPr lang="en-US" dirty="0"/>
+              <a:t>Using OGM directly was very slow</a:t>
+            </a:r>
+          </a:p>
+          <a:p>
+            <a:pPr lvl="1"/>
+            <a:r>
+              <a:rPr lang="en-US" dirty="0"/>
+              <a:t>Created unique constraints on the Neo4j database, generated python data structure that unwinds based on the constraints in Neo4j (much quicker data upload)</a:t>
+            </a:r>
+          </a:p>
+          <a:p>
+            <a:r>
+              <a:rPr lang="en-US" dirty="0"/>
+              <a:t>Flask</a:t>
+            </a:r>
+          </a:p>
+          <a:p>
+            <a:r>
+              <a:rPr lang="en-US" dirty="0" err="1"/>
+              <a:t>MongoEngine</a:t>
+            </a:r>
+            <a:endParaRPr lang="en-US" dirty="0"/>
           </a:p>
         </p:txBody>
       </p:sp>
@@ -4305,6 +4556,193 @@
     <p:extLst>
       <p:ext uri="{BB962C8B-B14F-4D97-AF65-F5344CB8AC3E}">
         <p14:creationId xmlns:p14="http://schemas.microsoft.com/office/powerpoint/2010/main" val="2999973653"/>
+      </p:ext>
+    </p:extLst>
+  </p:cSld>
+  <p:clrMapOvr>
+    <a:masterClrMapping/>
+  </p:clrMapOvr>
+</p:sld>
+</file>
+
+<file path=ppt/slides/slide8.xml><?xml version="1.0" encoding="utf-8"?>
+<p:sld xmlns:a="http://schemas.openxmlformats.org/drawingml/2006/main" xmlns:r="http://schemas.openxmlformats.org/officeDocument/2006/relationships" xmlns:p="http://schemas.openxmlformats.org/presentationml/2006/main">
+  <p:cSld>
+    <p:spTree>
+      <p:nvGrpSpPr>
+        <p:cNvPr id="1" name=""/>
+        <p:cNvGrpSpPr/>
+        <p:nvPr/>
+      </p:nvGrpSpPr>
+      <p:grpSpPr>
+        <a:xfrm>
+          <a:off x="0" y="0"/>
+          <a:ext cx="0" cy="0"/>
+          <a:chOff x="0" y="0"/>
+          <a:chExt cx="0" cy="0"/>
+        </a:xfrm>
+      </p:grpSpPr>
+      <p:sp>
+        <p:nvSpPr>
+          <p:cNvPr id="2" name="Title 1">
+            <a:extLst>
+              <a:ext uri="{FF2B5EF4-FFF2-40B4-BE49-F238E27FC236}">
+                <a16:creationId xmlns:a16="http://schemas.microsoft.com/office/drawing/2014/main" id="{182EBFFC-EEE9-9F4D-94C1-2C65980313C8}"/>
+              </a:ext>
+            </a:extLst>
+          </p:cNvPr>
+          <p:cNvSpPr>
+            <a:spLocks noGrp="1"/>
+          </p:cNvSpPr>
+          <p:nvPr>
+            <p:ph type="title"/>
+          </p:nvPr>
+        </p:nvSpPr>
+        <p:spPr/>
+        <p:txBody>
+          <a:bodyPr/>
+          <a:lstStyle/>
+          <a:p>
+            <a:r>
+              <a:rPr lang="en-US" dirty="0"/>
+              <a:t>Features Designed/Implemented</a:t>
+            </a:r>
+          </a:p>
+        </p:txBody>
+      </p:sp>
+      <p:sp>
+        <p:nvSpPr>
+          <p:cNvPr id="3" name="Content Placeholder 2">
+            <a:extLst>
+              <a:ext uri="{FF2B5EF4-FFF2-40B4-BE49-F238E27FC236}">
+                <a16:creationId xmlns:a16="http://schemas.microsoft.com/office/drawing/2014/main" id="{5B9A3EAA-1499-A04B-AFBF-57A5E762F32C}"/>
+              </a:ext>
+            </a:extLst>
+          </p:cNvPr>
+          <p:cNvSpPr>
+            <a:spLocks noGrp="1"/>
+          </p:cNvSpPr>
+          <p:nvPr>
+            <p:ph idx="1"/>
+          </p:nvPr>
+        </p:nvSpPr>
+        <p:spPr/>
+        <p:txBody>
+          <a:bodyPr/>
+          <a:lstStyle/>
+          <a:p>
+            <a:endParaRPr lang="en-US" dirty="0"/>
+          </a:p>
+        </p:txBody>
+      </p:sp>
+    </p:spTree>
+    <p:extLst>
+      <p:ext uri="{BB962C8B-B14F-4D97-AF65-F5344CB8AC3E}">
+        <p14:creationId xmlns:p14="http://schemas.microsoft.com/office/powerpoint/2010/main" val="358119744"/>
+      </p:ext>
+    </p:extLst>
+  </p:cSld>
+  <p:clrMapOvr>
+    <a:masterClrMapping/>
+  </p:clrMapOvr>
+</p:sld>
+</file>
+
+<file path=ppt/slides/slide9.xml><?xml version="1.0" encoding="utf-8"?>
+<p:sld xmlns:a="http://schemas.openxmlformats.org/drawingml/2006/main" xmlns:r="http://schemas.openxmlformats.org/officeDocument/2006/relationships" xmlns:p="http://schemas.openxmlformats.org/presentationml/2006/main">
+  <p:cSld>
+    <p:spTree>
+      <p:nvGrpSpPr>
+        <p:cNvPr id="1" name=""/>
+        <p:cNvGrpSpPr/>
+        <p:nvPr/>
+      </p:nvGrpSpPr>
+      <p:grpSpPr>
+        <a:xfrm>
+          <a:off x="0" y="0"/>
+          <a:ext cx="0" cy="0"/>
+          <a:chOff x="0" y="0"/>
+          <a:chExt cx="0" cy="0"/>
+        </a:xfrm>
+      </p:grpSpPr>
+      <p:sp>
+        <p:nvSpPr>
+          <p:cNvPr id="2" name="Title 1">
+            <a:extLst>
+              <a:ext uri="{FF2B5EF4-FFF2-40B4-BE49-F238E27FC236}">
+                <a16:creationId xmlns:a16="http://schemas.microsoft.com/office/drawing/2014/main" id="{93F1E6D4-F460-1243-8BAB-FE04082DE61E}"/>
+              </a:ext>
+            </a:extLst>
+          </p:cNvPr>
+          <p:cNvSpPr>
+            <a:spLocks noGrp="1"/>
+          </p:cNvSpPr>
+          <p:nvPr>
+            <p:ph type="title"/>
+          </p:nvPr>
+        </p:nvSpPr>
+        <p:spPr/>
+        <p:txBody>
+          <a:bodyPr/>
+          <a:lstStyle/>
+          <a:p>
+            <a:r>
+              <a:rPr lang="en-US" dirty="0"/>
+              <a:t>Queries Performed</a:t>
+            </a:r>
+          </a:p>
+        </p:txBody>
+      </p:sp>
+      <p:sp>
+        <p:nvSpPr>
+          <p:cNvPr id="3" name="Content Placeholder 2">
+            <a:extLst>
+              <a:ext uri="{FF2B5EF4-FFF2-40B4-BE49-F238E27FC236}">
+                <a16:creationId xmlns:a16="http://schemas.microsoft.com/office/drawing/2014/main" id="{B1E55EAC-891F-D043-B943-FDFC94F79449}"/>
+              </a:ext>
+            </a:extLst>
+          </p:cNvPr>
+          <p:cNvSpPr>
+            <a:spLocks noGrp="1"/>
+          </p:cNvSpPr>
+          <p:nvPr>
+            <p:ph idx="1"/>
+          </p:nvPr>
+        </p:nvSpPr>
+        <p:spPr/>
+        <p:txBody>
+          <a:bodyPr/>
+          <a:lstStyle/>
+          <a:p>
+            <a:r>
+              <a:rPr lang="en-US" dirty="0"/>
+              <a:t>Number of cases in a state over a date range</a:t>
+            </a:r>
+          </a:p>
+          <a:p>
+            <a:r>
+              <a:rPr lang="en-US" dirty="0"/>
+              <a:t>Number of cases in a county over a date range</a:t>
+            </a:r>
+          </a:p>
+          <a:p>
+            <a:r>
+              <a:rPr lang="en-US" dirty="0"/>
+              <a:t>Rank counties by net cases over a date range</a:t>
+            </a:r>
+          </a:p>
+          <a:p>
+            <a:r>
+              <a:rPr lang="en-US" dirty="0"/>
+              <a:t>Rank counties by cases as percentage of population over a date range</a:t>
+            </a:r>
+          </a:p>
+        </p:txBody>
+      </p:sp>
+    </p:spTree>
+    <p:extLst>
+      <p:ext uri="{BB962C8B-B14F-4D97-AF65-F5344CB8AC3E}">
+        <p14:creationId xmlns:p14="http://schemas.microsoft.com/office/powerpoint/2010/main" val="3514309768"/>
       </p:ext>
     </p:extLst>
   </p:cSld>

</xml_diff>